<commit_message>
chap 8 to 10
</commit_message>
<xml_diff>
--- a/Class Slides 2024/Class 8.pptx
+++ b/Class Slides 2024/Class 8.pptx
@@ -564,7 +564,7 @@
           <a:p>
             <a:fld id="{FA1B9F50-FE6C-4F6B-8908-CB1C4B189899}" type="datetimeFigureOut">
               <a:rPr lang="en-US" smtClean="0"/>
-              <a:t>1/11/2024</a:t>
+              <a:t>1/18/2024</a:t>
             </a:fld>
             <a:endParaRPr lang="en-US"/>
           </a:p>
@@ -1239,7 +1239,7 @@
           <a:p>
             <a:fld id="{F1A94D68-23BD-48D2-BC5F-602C755F07C6}" type="datetimeFigureOut">
               <a:rPr lang="en-US" smtClean="0"/>
-              <a:t>1/11/2024</a:t>
+              <a:t>1/18/2024</a:t>
             </a:fld>
             <a:endParaRPr lang="en-US"/>
           </a:p>
@@ -1437,7 +1437,7 @@
           <a:p>
             <a:fld id="{F1A94D68-23BD-48D2-BC5F-602C755F07C6}" type="datetimeFigureOut">
               <a:rPr lang="en-US" smtClean="0"/>
-              <a:t>1/11/2024</a:t>
+              <a:t>1/18/2024</a:t>
             </a:fld>
             <a:endParaRPr lang="en-US"/>
           </a:p>
@@ -1645,7 +1645,7 @@
           <a:p>
             <a:fld id="{F1A94D68-23BD-48D2-BC5F-602C755F07C6}" type="datetimeFigureOut">
               <a:rPr lang="en-US" smtClean="0"/>
-              <a:t>1/11/2024</a:t>
+              <a:t>1/18/2024</a:t>
             </a:fld>
             <a:endParaRPr lang="en-US"/>
           </a:p>
@@ -1843,7 +1843,7 @@
           <a:p>
             <a:fld id="{F1A94D68-23BD-48D2-BC5F-602C755F07C6}" type="datetimeFigureOut">
               <a:rPr lang="en-US" smtClean="0"/>
-              <a:t>1/11/2024</a:t>
+              <a:t>1/18/2024</a:t>
             </a:fld>
             <a:endParaRPr lang="en-US"/>
           </a:p>
@@ -2118,7 +2118,7 @@
           <a:p>
             <a:fld id="{F1A94D68-23BD-48D2-BC5F-602C755F07C6}" type="datetimeFigureOut">
               <a:rPr lang="en-US" smtClean="0"/>
-              <a:t>1/11/2024</a:t>
+              <a:t>1/18/2024</a:t>
             </a:fld>
             <a:endParaRPr lang="en-US"/>
           </a:p>
@@ -2383,7 +2383,7 @@
           <a:p>
             <a:fld id="{F1A94D68-23BD-48D2-BC5F-602C755F07C6}" type="datetimeFigureOut">
               <a:rPr lang="en-US" smtClean="0"/>
-              <a:t>1/11/2024</a:t>
+              <a:t>1/18/2024</a:t>
             </a:fld>
             <a:endParaRPr lang="en-US"/>
           </a:p>
@@ -2795,7 +2795,7 @@
           <a:p>
             <a:fld id="{F1A94D68-23BD-48D2-BC5F-602C755F07C6}" type="datetimeFigureOut">
               <a:rPr lang="en-US" smtClean="0"/>
-              <a:t>1/11/2024</a:t>
+              <a:t>1/18/2024</a:t>
             </a:fld>
             <a:endParaRPr lang="en-US"/>
           </a:p>
@@ -2936,7 +2936,7 @@
           <a:p>
             <a:fld id="{F1A94D68-23BD-48D2-BC5F-602C755F07C6}" type="datetimeFigureOut">
               <a:rPr lang="en-US" smtClean="0"/>
-              <a:t>1/11/2024</a:t>
+              <a:t>1/18/2024</a:t>
             </a:fld>
             <a:endParaRPr lang="en-US"/>
           </a:p>
@@ -3049,7 +3049,7 @@
           <a:p>
             <a:fld id="{F1A94D68-23BD-48D2-BC5F-602C755F07C6}" type="datetimeFigureOut">
               <a:rPr lang="en-US" smtClean="0"/>
-              <a:t>1/11/2024</a:t>
+              <a:t>1/18/2024</a:t>
             </a:fld>
             <a:endParaRPr lang="en-US"/>
           </a:p>
@@ -3360,7 +3360,7 @@
           <a:p>
             <a:fld id="{F1A94D68-23BD-48D2-BC5F-602C755F07C6}" type="datetimeFigureOut">
               <a:rPr lang="en-US" smtClean="0"/>
-              <a:t>1/11/2024</a:t>
+              <a:t>1/18/2024</a:t>
             </a:fld>
             <a:endParaRPr lang="en-US"/>
           </a:p>
@@ -3648,7 +3648,7 @@
           <a:p>
             <a:fld id="{F1A94D68-23BD-48D2-BC5F-602C755F07C6}" type="datetimeFigureOut">
               <a:rPr lang="en-US" smtClean="0"/>
-              <a:t>1/11/2024</a:t>
+              <a:t>1/18/2024</a:t>
             </a:fld>
             <a:endParaRPr lang="en-US"/>
           </a:p>
@@ -3889,7 +3889,7 @@
           <a:p>
             <a:fld id="{F1A94D68-23BD-48D2-BC5F-602C755F07C6}" type="datetimeFigureOut">
               <a:rPr lang="en-US" smtClean="0"/>
-              <a:t>1/11/2024</a:t>
+              <a:t>1/18/2024</a:t>
             </a:fld>
             <a:endParaRPr lang="en-US"/>
           </a:p>
@@ -4366,25 +4366,11 @@
           <a:p>
             <a:r>
               <a:rPr lang="en-US" dirty="0"/>
-              <a:t>Within-participant design</a:t>
+              <a:t>Chapter 7: Within-participant designs</a:t>
             </a:r>
           </a:p>
           <a:p>
             <a:endParaRPr lang="en-US" dirty="0"/>
-          </a:p>
-          <a:p>
-            <a:r>
-              <a:rPr lang="en-US" dirty="0"/>
-              <a:t>Gino &amp; </a:t>
-            </a:r>
-            <a:r>
-              <a:rPr lang="en-US" dirty="0" err="1"/>
-              <a:t>Wiltermuth</a:t>
-            </a:r>
-            <a:r>
-              <a:rPr lang="en-US" dirty="0"/>
-              <a:t> (2014)</a:t>
-            </a:r>
           </a:p>
         </p:txBody>
       </p:sp>
@@ -4564,7 +4550,7 @@
         <p:spPr bwMode="auto">
           <a:xfrm>
             <a:off x="961901" y="716189"/>
-            <a:ext cx="9547761" cy="5201424"/>
+            <a:ext cx="9547761" cy="5570756"/>
           </a:xfrm>
           <a:prstGeom prst="rect">
             <a:avLst/>
@@ -4593,7 +4579,21 @@
                 <a:latin typeface="Times New Roman" pitchFamily="18" charset="0"/>
                 <a:cs typeface="Times New Roman" pitchFamily="18" charset="0"/>
               </a:rPr>
-              <a:t>In an effort to determine the effects of the drug chlorpromazine on the performance of schizophrenics, two clinical investigators randomly selected 20 acute schizophrenics from a mental hospital population.</a:t>
+              <a:t>In an effort to determine the effects of the drug chlorpromazine on </a:t>
+            </a:r>
+            <a:r>
+              <a:rPr lang="en-US" sz="2400">
+                <a:latin typeface="Times New Roman" pitchFamily="18" charset="0"/>
+                <a:cs typeface="Times New Roman" pitchFamily="18" charset="0"/>
+              </a:rPr>
+              <a:t>the cognitive performance </a:t>
+            </a:r>
+            <a:r>
+              <a:rPr lang="en-US" sz="2400" dirty="0">
+                <a:latin typeface="Times New Roman" pitchFamily="18" charset="0"/>
+                <a:cs typeface="Times New Roman" pitchFamily="18" charset="0"/>
+              </a:rPr>
+              <a:t>of schizophrenics, two clinical investigators randomly selected 20 acute schizophrenics from a mental hospital population.</a:t>
             </a:r>
           </a:p>
           <a:p>

</xml_diff>